<commit_message>
Refinement after first run dry run
</commit_message>
<xml_diff>
--- a/2020-04-14 ONETUG App Communication Juxtaposition/Presentation.pptx
+++ b/2020-04-14 ONETUG App Communication Juxtaposition/Presentation.pptx
@@ -7,16 +7,17 @@
   <p:sldIdLst>
     <p:sldId id="256" r:id="rId2"/>
     <p:sldId id="264" r:id="rId3"/>
-    <p:sldId id="266" r:id="rId4"/>
-    <p:sldId id="265" r:id="rId5"/>
-    <p:sldId id="259" r:id="rId6"/>
-    <p:sldId id="267" r:id="rId7"/>
-    <p:sldId id="260" r:id="rId8"/>
-    <p:sldId id="268" r:id="rId9"/>
-    <p:sldId id="261" r:id="rId10"/>
-    <p:sldId id="269" r:id="rId11"/>
-    <p:sldId id="262" r:id="rId12"/>
-    <p:sldId id="257" r:id="rId13"/>
+    <p:sldId id="270" r:id="rId4"/>
+    <p:sldId id="266" r:id="rId5"/>
+    <p:sldId id="265" r:id="rId6"/>
+    <p:sldId id="259" r:id="rId7"/>
+    <p:sldId id="267" r:id="rId8"/>
+    <p:sldId id="260" r:id="rId9"/>
+    <p:sldId id="268" r:id="rId10"/>
+    <p:sldId id="261" r:id="rId11"/>
+    <p:sldId id="269" r:id="rId12"/>
+    <p:sldId id="262" r:id="rId13"/>
+    <p:sldId id="257" r:id="rId14"/>
   </p:sldIdLst>
   <p:sldSz cx="12192000" cy="6858000"/>
   <p:notesSz cx="6858000" cy="9144000"/>
@@ -115,6 +116,11 @@
       </a:defRPr>
     </a:lvl9pPr>
   </p:defaultTextStyle>
+  <p:extLst>
+    <p:ext uri="{EFAFB233-063F-42B5-8137-9DF3F51BA10A}">
+      <p15:sldGuideLst xmlns:p15="http://schemas.microsoft.com/office/powerpoint/2012/main"/>
+    </p:ext>
+  </p:extLst>
 </p:presentation>
 </file>
 
@@ -265,7 +271,7 @@
           <a:p>
             <a:fld id="{AB261542-C044-40E3-A832-4BC80D65D98C}" type="datetimeFigureOut">
               <a:rPr lang="en-US" smtClean="0"/>
-              <a:t>4/9/2020</a:t>
+              <a:t>4/10/2020</a:t>
             </a:fld>
             <a:endParaRPr lang="en-US"/>
           </a:p>
@@ -463,7 +469,7 @@
           <a:p>
             <a:fld id="{AB261542-C044-40E3-A832-4BC80D65D98C}" type="datetimeFigureOut">
               <a:rPr lang="en-US" smtClean="0"/>
-              <a:t>4/9/2020</a:t>
+              <a:t>4/10/2020</a:t>
             </a:fld>
             <a:endParaRPr lang="en-US"/>
           </a:p>
@@ -671,7 +677,7 @@
           <a:p>
             <a:fld id="{AB261542-C044-40E3-A832-4BC80D65D98C}" type="datetimeFigureOut">
               <a:rPr lang="en-US" smtClean="0"/>
-              <a:t>4/9/2020</a:t>
+              <a:t>4/10/2020</a:t>
             </a:fld>
             <a:endParaRPr lang="en-US"/>
           </a:p>
@@ -869,7 +875,7 @@
           <a:p>
             <a:fld id="{AB261542-C044-40E3-A832-4BC80D65D98C}" type="datetimeFigureOut">
               <a:rPr lang="en-US" smtClean="0"/>
-              <a:t>4/9/2020</a:t>
+              <a:t>4/10/2020</a:t>
             </a:fld>
             <a:endParaRPr lang="en-US"/>
           </a:p>
@@ -1144,7 +1150,7 @@
           <a:p>
             <a:fld id="{AB261542-C044-40E3-A832-4BC80D65D98C}" type="datetimeFigureOut">
               <a:rPr lang="en-US" smtClean="0"/>
-              <a:t>4/9/2020</a:t>
+              <a:t>4/10/2020</a:t>
             </a:fld>
             <a:endParaRPr lang="en-US"/>
           </a:p>
@@ -1409,7 +1415,7 @@
           <a:p>
             <a:fld id="{AB261542-C044-40E3-A832-4BC80D65D98C}" type="datetimeFigureOut">
               <a:rPr lang="en-US" smtClean="0"/>
-              <a:t>4/9/2020</a:t>
+              <a:t>4/10/2020</a:t>
             </a:fld>
             <a:endParaRPr lang="en-US"/>
           </a:p>
@@ -1821,7 +1827,7 @@
           <a:p>
             <a:fld id="{AB261542-C044-40E3-A832-4BC80D65D98C}" type="datetimeFigureOut">
               <a:rPr lang="en-US" smtClean="0"/>
-              <a:t>4/9/2020</a:t>
+              <a:t>4/10/2020</a:t>
             </a:fld>
             <a:endParaRPr lang="en-US"/>
           </a:p>
@@ -1962,7 +1968,7 @@
           <a:p>
             <a:fld id="{AB261542-C044-40E3-A832-4BC80D65D98C}" type="datetimeFigureOut">
               <a:rPr lang="en-US" smtClean="0"/>
-              <a:t>4/9/2020</a:t>
+              <a:t>4/10/2020</a:t>
             </a:fld>
             <a:endParaRPr lang="en-US"/>
           </a:p>
@@ -2075,7 +2081,7 @@
           <a:p>
             <a:fld id="{AB261542-C044-40E3-A832-4BC80D65D98C}" type="datetimeFigureOut">
               <a:rPr lang="en-US" smtClean="0"/>
-              <a:t>4/9/2020</a:t>
+              <a:t>4/10/2020</a:t>
             </a:fld>
             <a:endParaRPr lang="en-US"/>
           </a:p>
@@ -2386,7 +2392,7 @@
           <a:p>
             <a:fld id="{AB261542-C044-40E3-A832-4BC80D65D98C}" type="datetimeFigureOut">
               <a:rPr lang="en-US" smtClean="0"/>
-              <a:t>4/9/2020</a:t>
+              <a:t>4/10/2020</a:t>
             </a:fld>
             <a:endParaRPr lang="en-US"/>
           </a:p>
@@ -2674,7 +2680,7 @@
           <a:p>
             <a:fld id="{AB261542-C044-40E3-A832-4BC80D65D98C}" type="datetimeFigureOut">
               <a:rPr lang="en-US" smtClean="0"/>
-              <a:t>4/9/2020</a:t>
+              <a:t>4/10/2020</a:t>
             </a:fld>
             <a:endParaRPr lang="en-US"/>
           </a:p>
@@ -2915,7 +2921,7 @@
           <a:p>
             <a:fld id="{AB261542-C044-40E3-A832-4BC80D65D98C}" type="datetimeFigureOut">
               <a:rPr lang="en-US" smtClean="0"/>
-              <a:t>4/9/2020</a:t>
+              <a:t>4/10/2020</a:t>
             </a:fld>
             <a:endParaRPr lang="en-US"/>
           </a:p>
@@ -3383,14 +3389,19 @@
           <a:p>
             <a:r>
               <a:rPr lang="en-US" dirty="0"/>
-              <a:t>By Al Rodriguez</a:t>
+              <a:t>AKA</a:t>
             </a:r>
           </a:p>
           <a:p>
             <a:r>
               <a:rPr lang="en-US" dirty="0"/>
-              <a:t>@ProgrammerAL</a:t>
-            </a:r>
+              <a:t>JSON “vs” GRPC “vs” </a:t>
+            </a:r>
+            <a:r>
+              <a:rPr lang="en-US" dirty="0" err="1"/>
+              <a:t>SignalR</a:t>
+            </a:r>
+            <a:endParaRPr lang="en-US" dirty="0"/>
           </a:p>
         </p:txBody>
       </p:sp>
@@ -3426,10 +3437,10 @@
       </p:grpSpPr>
       <p:sp>
         <p:nvSpPr>
-          <p:cNvPr id="4" name="Title 3">
-            <a:extLst>
-              <a:ext uri="{FF2B5EF4-FFF2-40B4-BE49-F238E27FC236}">
-                <a16:creationId xmlns:a16="http://schemas.microsoft.com/office/drawing/2014/main" id="{77477E1C-3203-466F-9F92-80D59F653A30}"/>
+          <p:cNvPr id="2" name="Title 1">
+            <a:extLst>
+              <a:ext uri="{FF2B5EF4-FFF2-40B4-BE49-F238E27FC236}">
+                <a16:creationId xmlns:a16="http://schemas.microsoft.com/office/drawing/2014/main" id="{38FE279D-9820-4F27-8960-296370E99228}"/>
               </a:ext>
             </a:extLst>
           </p:cNvPr>
@@ -3446,16 +3457,85 @@
           <a:lstStyle/>
           <a:p>
             <a:r>
+              <a:rPr lang="en-US" dirty="0" err="1"/>
+              <a:t>SignalR</a:t>
+            </a:r>
+            <a:endParaRPr lang="en-US" dirty="0"/>
+          </a:p>
+        </p:txBody>
+      </p:sp>
+      <p:sp>
+        <p:nvSpPr>
+          <p:cNvPr id="3" name="Content Placeholder 2">
+            <a:extLst>
+              <a:ext uri="{FF2B5EF4-FFF2-40B4-BE49-F238E27FC236}">
+                <a16:creationId xmlns:a16="http://schemas.microsoft.com/office/drawing/2014/main" id="{610CBE65-6A96-407A-816E-1BAC2F1BB934}"/>
+              </a:ext>
+            </a:extLst>
+          </p:cNvPr>
+          <p:cNvSpPr>
+            <a:spLocks noGrp="1"/>
+          </p:cNvSpPr>
+          <p:nvPr>
+            <p:ph idx="1"/>
+          </p:nvPr>
+        </p:nvSpPr>
+        <p:spPr/>
+        <p:txBody>
+          <a:bodyPr/>
+          <a:lstStyle/>
+          <a:p>
+            <a:r>
               <a:rPr lang="en-US" dirty="0"/>
-              <a:t>Demo Time</a:t>
-            </a:r>
+              <a:t>Push or Pull</a:t>
+            </a:r>
+          </a:p>
+          <a:p>
+            <a:r>
+              <a:rPr lang="en-US" dirty="0"/>
+              <a:t>Uses </a:t>
+            </a:r>
+            <a:r>
+              <a:rPr lang="en-US" dirty="0" err="1"/>
+              <a:t>WebSockets</a:t>
+            </a:r>
+            <a:endParaRPr lang="en-US" dirty="0"/>
+          </a:p>
+          <a:p>
+            <a:r>
+              <a:rPr lang="en-US" dirty="0"/>
+              <a:t>Tracks connections between server/clients for you</a:t>
+            </a:r>
+          </a:p>
+          <a:p>
+            <a:r>
+              <a:rPr lang="en-US" dirty="0"/>
+              <a:t>JSON or </a:t>
+            </a:r>
+            <a:r>
+              <a:rPr lang="en-US" dirty="0" err="1"/>
+              <a:t>MessagePack</a:t>
+            </a:r>
+            <a:endParaRPr lang="en-US" dirty="0"/>
+          </a:p>
+          <a:p>
+            <a:r>
+              <a:rPr lang="en-US" dirty="0">
+                <a:hlinkClick r:id="rId2"/>
+              </a:rPr>
+              <a:t>https://msgpack.org/</a:t>
+            </a:r>
+            <a:endParaRPr lang="en-US" dirty="0"/>
+          </a:p>
+          <a:p>
+            <a:endParaRPr lang="en-US" dirty="0"/>
           </a:p>
         </p:txBody>
       </p:sp>
     </p:spTree>
     <p:extLst>
       <p:ext uri="{BB962C8B-B14F-4D97-AF65-F5344CB8AC3E}">
-        <p14:creationId xmlns:p14="http://schemas.microsoft.com/office/powerpoint/2010/main" val="2955267194"/>
+        <p14:creationId xmlns:p14="http://schemas.microsoft.com/office/powerpoint/2010/main" val="455678118"/>
       </p:ext>
     </p:extLst>
   </p:cSld>
@@ -3484,10 +3564,10 @@
       </p:grpSpPr>
       <p:sp>
         <p:nvSpPr>
-          <p:cNvPr id="2" name="Title 1">
-            <a:extLst>
-              <a:ext uri="{FF2B5EF4-FFF2-40B4-BE49-F238E27FC236}">
-                <a16:creationId xmlns:a16="http://schemas.microsoft.com/office/drawing/2014/main" id="{8A0A83BD-C85A-4023-A31C-689E1AC8A329}"/>
+          <p:cNvPr id="4" name="Title 3">
+            <a:extLst>
+              <a:ext uri="{FF2B5EF4-FFF2-40B4-BE49-F238E27FC236}">
+                <a16:creationId xmlns:a16="http://schemas.microsoft.com/office/drawing/2014/main" id="{77477E1C-3203-466F-9F92-80D59F653A30}"/>
               </a:ext>
             </a:extLst>
           </p:cNvPr>
@@ -3505,69 +3585,15 @@
           <a:p>
             <a:r>
               <a:rPr lang="en-US" dirty="0"/>
-              <a:t>Extra Thoughts</a:t>
-            </a:r>
-          </a:p>
-        </p:txBody>
-      </p:sp>
-      <p:sp>
-        <p:nvSpPr>
-          <p:cNvPr id="3" name="Content Placeholder 2">
-            <a:extLst>
-              <a:ext uri="{FF2B5EF4-FFF2-40B4-BE49-F238E27FC236}">
-                <a16:creationId xmlns:a16="http://schemas.microsoft.com/office/drawing/2014/main" id="{34D9B4DF-BEFA-452B-812F-C29EB2BEAAC1}"/>
-              </a:ext>
-            </a:extLst>
-          </p:cNvPr>
-          <p:cNvSpPr>
-            <a:spLocks noGrp="1"/>
-          </p:cNvSpPr>
-          <p:nvPr>
-            <p:ph idx="1"/>
-          </p:nvPr>
-        </p:nvSpPr>
-        <p:spPr/>
-        <p:txBody>
-          <a:bodyPr/>
-          <a:lstStyle/>
-          <a:p>
-            <a:r>
-              <a:rPr lang="en-US" dirty="0" err="1"/>
-              <a:t>GraphQL</a:t>
-            </a:r>
-            <a:endParaRPr lang="en-US" dirty="0"/>
-          </a:p>
-          <a:p>
-            <a:pPr lvl="1"/>
-            <a:r>
-              <a:rPr lang="en-US" dirty="0"/>
-              <a:t>Built on top of JSON</a:t>
-            </a:r>
-          </a:p>
-          <a:p>
-            <a:r>
-              <a:rPr lang="en-US" dirty="0"/>
-              <a:t>Message Queues</a:t>
-            </a:r>
-          </a:p>
-          <a:p>
-            <a:pPr lvl="1"/>
-            <a:r>
-              <a:rPr lang="en-US" dirty="0"/>
-              <a:t>AMQP/MQTT/</a:t>
-            </a:r>
-            <a:r>
-              <a:rPr lang="en-US" dirty="0" err="1"/>
-              <a:t>etc</a:t>
-            </a:r>
-            <a:endParaRPr lang="en-US" dirty="0"/>
+              <a:t>Demo Time</a:t>
+            </a:r>
           </a:p>
         </p:txBody>
       </p:sp>
     </p:spTree>
     <p:extLst>
       <p:ext uri="{BB962C8B-B14F-4D97-AF65-F5344CB8AC3E}">
-        <p14:creationId xmlns:p14="http://schemas.microsoft.com/office/powerpoint/2010/main" val="3327718054"/>
+        <p14:creationId xmlns:p14="http://schemas.microsoft.com/office/powerpoint/2010/main" val="2955267194"/>
       </p:ext>
     </p:extLst>
   </p:cSld>
@@ -3599,6 +3625,118 @@
           <p:cNvPr id="2" name="Title 1">
             <a:extLst>
               <a:ext uri="{FF2B5EF4-FFF2-40B4-BE49-F238E27FC236}">
+                <a16:creationId xmlns:a16="http://schemas.microsoft.com/office/drawing/2014/main" id="{8A0A83BD-C85A-4023-A31C-689E1AC8A329}"/>
+              </a:ext>
+            </a:extLst>
+          </p:cNvPr>
+          <p:cNvSpPr>
+            <a:spLocks noGrp="1"/>
+          </p:cNvSpPr>
+          <p:nvPr>
+            <p:ph type="title"/>
+          </p:nvPr>
+        </p:nvSpPr>
+        <p:spPr/>
+        <p:txBody>
+          <a:bodyPr/>
+          <a:lstStyle/>
+          <a:p>
+            <a:r>
+              <a:rPr lang="en-US" dirty="0"/>
+              <a:t>Extra Thoughts</a:t>
+            </a:r>
+          </a:p>
+        </p:txBody>
+      </p:sp>
+      <p:sp>
+        <p:nvSpPr>
+          <p:cNvPr id="3" name="Content Placeholder 2">
+            <a:extLst>
+              <a:ext uri="{FF2B5EF4-FFF2-40B4-BE49-F238E27FC236}">
+                <a16:creationId xmlns:a16="http://schemas.microsoft.com/office/drawing/2014/main" id="{34D9B4DF-BEFA-452B-812F-C29EB2BEAAC1}"/>
+              </a:ext>
+            </a:extLst>
+          </p:cNvPr>
+          <p:cNvSpPr>
+            <a:spLocks noGrp="1"/>
+          </p:cNvSpPr>
+          <p:nvPr>
+            <p:ph idx="1"/>
+          </p:nvPr>
+        </p:nvSpPr>
+        <p:spPr/>
+        <p:txBody>
+          <a:bodyPr/>
+          <a:lstStyle/>
+          <a:p>
+            <a:r>
+              <a:rPr lang="en-US" dirty="0" err="1"/>
+              <a:t>GraphQL</a:t>
+            </a:r>
+            <a:endParaRPr lang="en-US" dirty="0"/>
+          </a:p>
+          <a:p>
+            <a:pPr lvl="1"/>
+            <a:r>
+              <a:rPr lang="en-US" dirty="0"/>
+              <a:t>Built on top of JSON</a:t>
+            </a:r>
+          </a:p>
+          <a:p>
+            <a:r>
+              <a:rPr lang="en-US" dirty="0"/>
+              <a:t>Message Queues</a:t>
+            </a:r>
+          </a:p>
+          <a:p>
+            <a:pPr lvl="1"/>
+            <a:r>
+              <a:rPr lang="en-US" dirty="0"/>
+              <a:t>AMQP/MQTT/</a:t>
+            </a:r>
+            <a:r>
+              <a:rPr lang="en-US" dirty="0" err="1"/>
+              <a:t>etc</a:t>
+            </a:r>
+            <a:endParaRPr lang="en-US" dirty="0"/>
+          </a:p>
+        </p:txBody>
+      </p:sp>
+    </p:spTree>
+    <p:extLst>
+      <p:ext uri="{BB962C8B-B14F-4D97-AF65-F5344CB8AC3E}">
+        <p14:creationId xmlns:p14="http://schemas.microsoft.com/office/powerpoint/2010/main" val="3327718054"/>
+      </p:ext>
+    </p:extLst>
+  </p:cSld>
+  <p:clrMapOvr>
+    <a:masterClrMapping/>
+  </p:clrMapOvr>
+</p:sld>
+</file>
+
+<file path=ppt/slides/slide13.xml><?xml version="1.0" encoding="utf-8"?>
+<p:sld xmlns:a="http://schemas.openxmlformats.org/drawingml/2006/main" xmlns:r="http://schemas.openxmlformats.org/officeDocument/2006/relationships" xmlns:p="http://schemas.openxmlformats.org/presentationml/2006/main">
+  <p:cSld>
+    <p:spTree>
+      <p:nvGrpSpPr>
+        <p:cNvPr id="1" name=""/>
+        <p:cNvGrpSpPr/>
+        <p:nvPr/>
+      </p:nvGrpSpPr>
+      <p:grpSpPr>
+        <a:xfrm>
+          <a:off x="0" y="0"/>
+          <a:ext cx="0" cy="0"/>
+          <a:chOff x="0" y="0"/>
+          <a:chExt cx="0" cy="0"/>
+        </a:xfrm>
+      </p:grpSpPr>
+      <p:sp>
+        <p:nvSpPr>
+          <p:cNvPr id="2" name="Title 1">
+            <a:extLst>
+              <a:ext uri="{FF2B5EF4-FFF2-40B4-BE49-F238E27FC236}">
                 <a16:creationId xmlns:a16="http://schemas.microsoft.com/office/drawing/2014/main" id="{B0AFB9A7-3EEB-4A3D-9521-895AA44D0456}"/>
               </a:ext>
             </a:extLst>
@@ -3615,32 +3753,47 @@
           <a:bodyPr/>
           <a:lstStyle/>
           <a:p>
+            <a:r>
+              <a:rPr lang="en-US" dirty="0"/>
+              <a:t>Shameless Self Promotion</a:t>
+            </a:r>
+          </a:p>
+        </p:txBody>
+      </p:sp>
+      <p:sp>
+        <p:nvSpPr>
+          <p:cNvPr id="3" name="Content Placeholder 2">
+            <a:extLst>
+              <a:ext uri="{FF2B5EF4-FFF2-40B4-BE49-F238E27FC236}">
+                <a16:creationId xmlns:a16="http://schemas.microsoft.com/office/drawing/2014/main" id="{0B0FA796-6390-4314-A98B-36963B2913BF}"/>
+              </a:ext>
+            </a:extLst>
+          </p:cNvPr>
+          <p:cNvSpPr>
+            <a:spLocks noGrp="1"/>
+          </p:cNvSpPr>
+          <p:nvPr>
+            <p:ph idx="1"/>
+          </p:nvPr>
+        </p:nvSpPr>
+        <p:spPr/>
+        <p:txBody>
+          <a:bodyPr/>
+          <a:lstStyle/>
+          <a:p>
+            <a:r>
+              <a:rPr lang="en-US" dirty="0"/>
+              <a:t>Orlando IoT Meetup</a:t>
+            </a:r>
+          </a:p>
+          <a:p>
+            <a:r>
+              <a:rPr lang="en-US" dirty="0"/>
+              <a:t>Find me online: @ProgrammerAL</a:t>
+            </a:r>
+          </a:p>
+          <a:p>
             <a:endParaRPr lang="en-US" dirty="0"/>
-          </a:p>
-        </p:txBody>
-      </p:sp>
-      <p:sp>
-        <p:nvSpPr>
-          <p:cNvPr id="3" name="Content Placeholder 2">
-            <a:extLst>
-              <a:ext uri="{FF2B5EF4-FFF2-40B4-BE49-F238E27FC236}">
-                <a16:creationId xmlns:a16="http://schemas.microsoft.com/office/drawing/2014/main" id="{0B0FA796-6390-4314-A98B-36963B2913BF}"/>
-              </a:ext>
-            </a:extLst>
-          </p:cNvPr>
-          <p:cNvSpPr>
-            <a:spLocks noGrp="1"/>
-          </p:cNvSpPr>
-          <p:nvPr>
-            <p:ph idx="1"/>
-          </p:nvPr>
-        </p:nvSpPr>
-        <p:spPr/>
-        <p:txBody>
-          <a:bodyPr/>
-          <a:lstStyle/>
-          <a:p>
-            <a:endParaRPr lang="en-US"/>
           </a:p>
         </p:txBody>
       </p:sp>
@@ -3734,9 +3887,6 @@
               <a:t>Deciding when to use one over the other</a:t>
             </a:r>
           </a:p>
-          <a:p>
-            <a:endParaRPr lang="en-US" dirty="0"/>
-          </a:p>
         </p:txBody>
       </p:sp>
       <p:sp>
@@ -3833,7 +3983,7 @@
           <p:cNvPr id="2" name="Title 1">
             <a:extLst>
               <a:ext uri="{FF2B5EF4-FFF2-40B4-BE49-F238E27FC236}">
-                <a16:creationId xmlns:a16="http://schemas.microsoft.com/office/drawing/2014/main" id="{410FA65C-188E-431C-8FE4-7861553E7D5D}"/>
+                <a16:creationId xmlns:a16="http://schemas.microsoft.com/office/drawing/2014/main" id="{8F2D5EE8-9418-494A-8BAC-F2C2072BF304}"/>
               </a:ext>
             </a:extLst>
           </p:cNvPr>
@@ -3851,7 +4001,7 @@
           <a:p>
             <a:r>
               <a:rPr lang="en-US" dirty="0"/>
-              <a:t>What do they all have in common?</a:t>
+              <a:t>Why are we talking about this?</a:t>
             </a:r>
           </a:p>
         </p:txBody>
@@ -3861,7 +4011,7 @@
           <p:cNvPr id="3" name="Content Placeholder 2">
             <a:extLst>
               <a:ext uri="{FF2B5EF4-FFF2-40B4-BE49-F238E27FC236}">
-                <a16:creationId xmlns:a16="http://schemas.microsoft.com/office/drawing/2014/main" id="{848C1CBD-89FE-4BDA-BF0A-A7FC47094962}"/>
+                <a16:creationId xmlns:a16="http://schemas.microsoft.com/office/drawing/2014/main" id="{531DC338-8883-45F4-B522-B61DC0FAA5E3}"/>
               </a:ext>
             </a:extLst>
           </p:cNvPr>
@@ -3879,15 +4029,24 @@
           <a:p>
             <a:r>
               <a:rPr lang="en-US" dirty="0"/>
-              <a:t>Cross Platform</a:t>
-            </a:r>
+              <a:t>Marketing is very similar for each technology</a:t>
+            </a:r>
+          </a:p>
+          <a:p>
+            <a:r>
+              <a:rPr lang="en-US" dirty="0"/>
+              <a:t>Sounded like a fun talk</a:t>
+            </a:r>
+          </a:p>
+          <a:p>
+            <a:endParaRPr lang="en-US" dirty="0"/>
           </a:p>
         </p:txBody>
       </p:sp>
     </p:spTree>
     <p:extLst>
       <p:ext uri="{BB962C8B-B14F-4D97-AF65-F5344CB8AC3E}">
-        <p14:creationId xmlns:p14="http://schemas.microsoft.com/office/powerpoint/2010/main" val="3031138637"/>
+        <p14:creationId xmlns:p14="http://schemas.microsoft.com/office/powerpoint/2010/main" val="3154356985"/>
       </p:ext>
     </p:extLst>
   </p:cSld>
@@ -3919,7 +4078,7 @@
           <p:cNvPr id="2" name="Title 1">
             <a:extLst>
               <a:ext uri="{FF2B5EF4-FFF2-40B4-BE49-F238E27FC236}">
-                <a16:creationId xmlns:a16="http://schemas.microsoft.com/office/drawing/2014/main" id="{29F17621-BC0E-46DF-9451-5C5D46EB3FC4}"/>
+                <a16:creationId xmlns:a16="http://schemas.microsoft.com/office/drawing/2014/main" id="{410FA65C-188E-431C-8FE4-7861553E7D5D}"/>
               </a:ext>
             </a:extLst>
           </p:cNvPr>
@@ -3935,7 +4094,10 @@
           <a:bodyPr/>
           <a:lstStyle/>
           <a:p>
-            <a:endParaRPr lang="en-US" dirty="0"/>
+            <a:r>
+              <a:rPr lang="en-US" dirty="0"/>
+              <a:t>What do they all have in common?</a:t>
+            </a:r>
           </a:p>
         </p:txBody>
       </p:sp>
@@ -3944,7 +4106,7 @@
           <p:cNvPr id="3" name="Content Placeholder 2">
             <a:extLst>
               <a:ext uri="{FF2B5EF4-FFF2-40B4-BE49-F238E27FC236}">
-                <a16:creationId xmlns:a16="http://schemas.microsoft.com/office/drawing/2014/main" id="{09FDBC3C-C106-42A7-AC53-60DD4C9CBAD1}"/>
+                <a16:creationId xmlns:a16="http://schemas.microsoft.com/office/drawing/2014/main" id="{848C1CBD-89FE-4BDA-BF0A-A7FC47094962}"/>
               </a:ext>
             </a:extLst>
           </p:cNvPr>
@@ -3962,74 +4124,10 @@
           <a:p>
             <a:r>
               <a:rPr lang="en-US" dirty="0"/>
-              <a:t>JSON with REST</a:t>
-            </a:r>
-          </a:p>
-          <a:p>
-            <a:pPr lvl="1"/>
-            <a:r>
-              <a:rPr lang="en-US" dirty="0"/>
-              <a:t>Public Facing APIs</a:t>
-            </a:r>
-          </a:p>
-          <a:p>
-            <a:r>
-              <a:rPr lang="en-US" dirty="0"/>
-              <a:t>GRPC</a:t>
-            </a:r>
-          </a:p>
-          <a:p>
-            <a:pPr lvl="1"/>
-            <a:r>
-              <a:rPr lang="en-US" dirty="0"/>
-              <a:t>Internal app messaging</a:t>
-            </a:r>
-          </a:p>
-          <a:p>
-            <a:pPr lvl="1"/>
-            <a:r>
-              <a:rPr lang="en-US" dirty="0"/>
-              <a:t>Microservices</a:t>
-            </a:r>
-          </a:p>
-          <a:p>
-            <a:pPr lvl="1"/>
-            <a:r>
-              <a:rPr lang="en-US" dirty="0"/>
-              <a:t>When performance is most important feature (video games, </a:t>
-            </a:r>
-            <a:r>
-              <a:rPr lang="en-US" dirty="0" err="1"/>
-              <a:t>etc</a:t>
-            </a:r>
-            <a:r>
-              <a:rPr lang="en-US" dirty="0"/>
-              <a:t>)</a:t>
-            </a:r>
-          </a:p>
-          <a:p>
-            <a:r>
-              <a:rPr lang="en-US" dirty="0" err="1"/>
-              <a:t>SignalR</a:t>
-            </a:r>
-            <a:endParaRPr lang="en-US" dirty="0"/>
-          </a:p>
-          <a:p>
-            <a:pPr lvl="1"/>
-            <a:r>
-              <a:rPr lang="en-US" dirty="0"/>
-              <a:t>When push architecture is better</a:t>
-            </a:r>
-          </a:p>
-          <a:p>
-            <a:pPr lvl="1"/>
-            <a:r>
-              <a:rPr lang="en-US" dirty="0"/>
-              <a:t>When you control server and client</a:t>
-            </a:r>
-          </a:p>
-          <a:p>
-            <a:pPr lvl="1"/>
+              <a:t>Cross Platform</a:t>
+            </a:r>
+          </a:p>
+          <a:p>
             <a:endParaRPr lang="en-US" dirty="0"/>
           </a:p>
         </p:txBody>
@@ -4037,7 +4135,7 @@
     </p:spTree>
     <p:extLst>
       <p:ext uri="{BB962C8B-B14F-4D97-AF65-F5344CB8AC3E}">
-        <p14:creationId xmlns:p14="http://schemas.microsoft.com/office/powerpoint/2010/main" val="76572123"/>
+        <p14:creationId xmlns:p14="http://schemas.microsoft.com/office/powerpoint/2010/main" val="3031138637"/>
       </p:ext>
     </p:extLst>
   </p:cSld>
@@ -4069,7 +4167,7 @@
           <p:cNvPr id="2" name="Title 1">
             <a:extLst>
               <a:ext uri="{FF2B5EF4-FFF2-40B4-BE49-F238E27FC236}">
-                <a16:creationId xmlns:a16="http://schemas.microsoft.com/office/drawing/2014/main" id="{33518422-075D-4BD6-92E7-C861C3E35C20}"/>
+                <a16:creationId xmlns:a16="http://schemas.microsoft.com/office/drawing/2014/main" id="{29F17621-BC0E-46DF-9451-5C5D46EB3FC4}"/>
               </a:ext>
             </a:extLst>
           </p:cNvPr>
@@ -4087,7 +4185,7 @@
           <a:p>
             <a:r>
               <a:rPr lang="en-US" dirty="0"/>
-              <a:t>REST with JSON</a:t>
+              <a:t>When would I use each?</a:t>
             </a:r>
           </a:p>
         </p:txBody>
@@ -4097,7 +4195,7 @@
           <p:cNvPr id="3" name="Content Placeholder 2">
             <a:extLst>
               <a:ext uri="{FF2B5EF4-FFF2-40B4-BE49-F238E27FC236}">
-                <a16:creationId xmlns:a16="http://schemas.microsoft.com/office/drawing/2014/main" id="{F8D74C80-759E-4812-B577-358F8BB4B7F8}"/>
+                <a16:creationId xmlns:a16="http://schemas.microsoft.com/office/drawing/2014/main" id="{09FDBC3C-C106-42A7-AC53-60DD4C9CBAD1}"/>
               </a:ext>
             </a:extLst>
           </p:cNvPr>
@@ -4115,27 +4213,82 @@
           <a:p>
             <a:r>
               <a:rPr lang="en-US" dirty="0"/>
-              <a:t>“Traditional”</a:t>
-            </a:r>
-          </a:p>
-          <a:p>
+              <a:t>JSON with REST</a:t>
+            </a:r>
+          </a:p>
+          <a:p>
+            <a:pPr lvl="1"/>
             <a:r>
               <a:rPr lang="en-US" dirty="0"/>
-              <a:t>Loosely coupled</a:t>
+              <a:t>Public Facing APIs</a:t>
             </a:r>
           </a:p>
           <a:p>
             <a:r>
               <a:rPr lang="en-US" dirty="0"/>
-              <a:t>Human Readable</a:t>
-            </a:r>
+              <a:t>GRPC</a:t>
+            </a:r>
+          </a:p>
+          <a:p>
+            <a:pPr lvl="1"/>
+            <a:r>
+              <a:rPr lang="en-US" dirty="0"/>
+              <a:t>Internal app messaging</a:t>
+            </a:r>
+          </a:p>
+          <a:p>
+            <a:pPr lvl="1"/>
+            <a:r>
+              <a:rPr lang="en-US" dirty="0"/>
+              <a:t>Microservices</a:t>
+            </a:r>
+          </a:p>
+          <a:p>
+            <a:pPr lvl="1"/>
+            <a:r>
+              <a:rPr lang="en-US" dirty="0"/>
+              <a:t>When performance is most important feature (video games, </a:t>
+            </a:r>
+            <a:r>
+              <a:rPr lang="en-US" dirty="0" err="1"/>
+              <a:t>etc</a:t>
+            </a:r>
+            <a:r>
+              <a:rPr lang="en-US" dirty="0"/>
+              <a:t>)</a:t>
+            </a:r>
+          </a:p>
+          <a:p>
+            <a:r>
+              <a:rPr lang="en-US" dirty="0" err="1"/>
+              <a:t>SignalR</a:t>
+            </a:r>
+            <a:endParaRPr lang="en-US" dirty="0"/>
+          </a:p>
+          <a:p>
+            <a:pPr lvl="1"/>
+            <a:r>
+              <a:rPr lang="en-US" dirty="0"/>
+              <a:t>When push architecture is better</a:t>
+            </a:r>
+          </a:p>
+          <a:p>
+            <a:pPr lvl="1"/>
+            <a:r>
+              <a:rPr lang="en-US" dirty="0"/>
+              <a:t>When you control server and client</a:t>
+            </a:r>
+          </a:p>
+          <a:p>
+            <a:pPr lvl="1"/>
+            <a:endParaRPr lang="en-US" dirty="0"/>
           </a:p>
         </p:txBody>
       </p:sp>
     </p:spTree>
     <p:extLst>
       <p:ext uri="{BB962C8B-B14F-4D97-AF65-F5344CB8AC3E}">
-        <p14:creationId xmlns:p14="http://schemas.microsoft.com/office/powerpoint/2010/main" val="1727133521"/>
+        <p14:creationId xmlns:p14="http://schemas.microsoft.com/office/powerpoint/2010/main" val="76572123"/>
       </p:ext>
     </p:extLst>
   </p:cSld>
@@ -4164,10 +4317,10 @@
       </p:grpSpPr>
       <p:sp>
         <p:nvSpPr>
-          <p:cNvPr id="4" name="Title 3">
-            <a:extLst>
-              <a:ext uri="{FF2B5EF4-FFF2-40B4-BE49-F238E27FC236}">
-                <a16:creationId xmlns:a16="http://schemas.microsoft.com/office/drawing/2014/main" id="{77477E1C-3203-466F-9F92-80D59F653A30}"/>
+          <p:cNvPr id="2" name="Title 1">
+            <a:extLst>
+              <a:ext uri="{FF2B5EF4-FFF2-40B4-BE49-F238E27FC236}">
+                <a16:creationId xmlns:a16="http://schemas.microsoft.com/office/drawing/2014/main" id="{33518422-075D-4BD6-92E7-C861C3E35C20}"/>
               </a:ext>
             </a:extLst>
           </p:cNvPr>
@@ -4185,7 +4338,47 @@
           <a:p>
             <a:r>
               <a:rPr lang="en-US" dirty="0"/>
-              <a:t>Demo Time</a:t>
+              <a:t>REST with JSON</a:t>
+            </a:r>
+          </a:p>
+        </p:txBody>
+      </p:sp>
+      <p:sp>
+        <p:nvSpPr>
+          <p:cNvPr id="3" name="Content Placeholder 2">
+            <a:extLst>
+              <a:ext uri="{FF2B5EF4-FFF2-40B4-BE49-F238E27FC236}">
+                <a16:creationId xmlns:a16="http://schemas.microsoft.com/office/drawing/2014/main" id="{F8D74C80-759E-4812-B577-358F8BB4B7F8}"/>
+              </a:ext>
+            </a:extLst>
+          </p:cNvPr>
+          <p:cNvSpPr>
+            <a:spLocks noGrp="1"/>
+          </p:cNvSpPr>
+          <p:nvPr>
+            <p:ph idx="1"/>
+          </p:nvPr>
+        </p:nvSpPr>
+        <p:spPr/>
+        <p:txBody>
+          <a:bodyPr/>
+          <a:lstStyle/>
+          <a:p>
+            <a:r>
+              <a:rPr lang="en-US" dirty="0"/>
+              <a:t>“Traditional”</a:t>
+            </a:r>
+          </a:p>
+          <a:p>
+            <a:r>
+              <a:rPr lang="en-US" dirty="0"/>
+              <a:t>Loosely coupled</a:t>
+            </a:r>
+          </a:p>
+          <a:p>
+            <a:r>
+              <a:rPr lang="en-US" dirty="0"/>
+              <a:t>Human Readable</a:t>
             </a:r>
           </a:p>
         </p:txBody>
@@ -4193,7 +4386,7 @@
     </p:spTree>
     <p:extLst>
       <p:ext uri="{BB962C8B-B14F-4D97-AF65-F5344CB8AC3E}">
-        <p14:creationId xmlns:p14="http://schemas.microsoft.com/office/powerpoint/2010/main" val="2344446595"/>
+        <p14:creationId xmlns:p14="http://schemas.microsoft.com/office/powerpoint/2010/main" val="1727133521"/>
       </p:ext>
     </p:extLst>
   </p:cSld>
@@ -4222,10 +4415,10 @@
       </p:grpSpPr>
       <p:sp>
         <p:nvSpPr>
-          <p:cNvPr id="2" name="Title 1">
-            <a:extLst>
-              <a:ext uri="{FF2B5EF4-FFF2-40B4-BE49-F238E27FC236}">
-                <a16:creationId xmlns:a16="http://schemas.microsoft.com/office/drawing/2014/main" id="{9C6F6B5F-9E01-4BB6-8B49-907EFE365C08}"/>
+          <p:cNvPr id="4" name="Title 3">
+            <a:extLst>
+              <a:ext uri="{FF2B5EF4-FFF2-40B4-BE49-F238E27FC236}">
+                <a16:creationId xmlns:a16="http://schemas.microsoft.com/office/drawing/2014/main" id="{77477E1C-3203-466F-9F92-80D59F653A30}"/>
               </a:ext>
             </a:extLst>
           </p:cNvPr>
@@ -4243,104 +4436,15 @@
           <a:p>
             <a:r>
               <a:rPr lang="en-US" dirty="0"/>
-              <a:t>GRPC</a:t>
-            </a:r>
-          </a:p>
-        </p:txBody>
-      </p:sp>
-      <p:sp>
-        <p:nvSpPr>
-          <p:cNvPr id="3" name="Content Placeholder 2">
-            <a:extLst>
-              <a:ext uri="{FF2B5EF4-FFF2-40B4-BE49-F238E27FC236}">
-                <a16:creationId xmlns:a16="http://schemas.microsoft.com/office/drawing/2014/main" id="{843C2D39-93A9-41D3-BBDF-E7FC25B4BC8D}"/>
-              </a:ext>
-            </a:extLst>
-          </p:cNvPr>
-          <p:cNvSpPr>
-            <a:spLocks noGrp="1"/>
-          </p:cNvSpPr>
-          <p:nvPr>
-            <p:ph idx="1"/>
-          </p:nvPr>
-        </p:nvSpPr>
-        <p:spPr/>
-        <p:txBody>
-          <a:bodyPr/>
-          <a:lstStyle/>
-          <a:p>
-            <a:r>
-              <a:rPr lang="en-US" dirty="0"/>
-              <a:t>Transmit over HTTP2</a:t>
-            </a:r>
-          </a:p>
-          <a:p>
-            <a:r>
-              <a:rPr lang="en-US" dirty="0"/>
-              <a:t>Built over Protocol Buffers (aka </a:t>
-            </a:r>
-            <a:r>
-              <a:rPr lang="en-US" dirty="0" err="1"/>
-              <a:t>Protobuf</a:t>
-            </a:r>
-            <a:r>
-              <a:rPr lang="en-US" dirty="0"/>
-              <a:t>)</a:t>
-            </a:r>
-          </a:p>
-          <a:p>
-            <a:r>
-              <a:rPr lang="en-US" dirty="0"/>
-              <a:t>Binary encoding</a:t>
-            </a:r>
-          </a:p>
-          <a:p>
-            <a:r>
-              <a:rPr lang="en-US" dirty="0"/>
-              <a:t>Schema based</a:t>
-            </a:r>
-          </a:p>
-          <a:p>
-            <a:r>
-              <a:rPr lang="en-US" dirty="0"/>
-              <a:t>“Spiritual Successor” to WCF</a:t>
-            </a:r>
-          </a:p>
-          <a:p>
-            <a:pPr lvl="1"/>
-            <a:r>
-              <a:rPr lang="en-US" dirty="0"/>
-              <a:t>Some have said</a:t>
-            </a:r>
-          </a:p>
-          <a:p>
-            <a:r>
-              <a:rPr lang="en-US">
-                <a:hlinkClick r:id="rId2"/>
-              </a:rPr>
-              <a:t>https://grpc.io/</a:t>
-            </a:r>
-            <a:endParaRPr lang="en-US"/>
-          </a:p>
-          <a:p>
-            <a:pPr lvl="1"/>
-            <a:r>
-              <a:rPr lang="en-US">
-                <a:hlinkClick r:id="rId3"/>
-              </a:rPr>
-              <a:t>https://developers.google.com/protocol-buffers/</a:t>
-            </a:r>
-            <a:endParaRPr lang="en-US" dirty="0"/>
-          </a:p>
-          <a:p>
-            <a:endParaRPr lang="en-US" dirty="0"/>
+              <a:t>Demo Time</a:t>
+            </a:r>
           </a:p>
         </p:txBody>
       </p:sp>
     </p:spTree>
     <p:extLst>
       <p:ext uri="{BB962C8B-B14F-4D97-AF65-F5344CB8AC3E}">
-        <p14:creationId xmlns:p14="http://schemas.microsoft.com/office/powerpoint/2010/main" val="3350301512"/>
+        <p14:creationId xmlns:p14="http://schemas.microsoft.com/office/powerpoint/2010/main" val="2344446595"/>
       </p:ext>
     </p:extLst>
   </p:cSld>
@@ -4369,10 +4473,10 @@
       </p:grpSpPr>
       <p:sp>
         <p:nvSpPr>
-          <p:cNvPr id="4" name="Title 3">
-            <a:extLst>
-              <a:ext uri="{FF2B5EF4-FFF2-40B4-BE49-F238E27FC236}">
-                <a16:creationId xmlns:a16="http://schemas.microsoft.com/office/drawing/2014/main" id="{77477E1C-3203-466F-9F92-80D59F653A30}"/>
+          <p:cNvPr id="2" name="Title 1">
+            <a:extLst>
+              <a:ext uri="{FF2B5EF4-FFF2-40B4-BE49-F238E27FC236}">
+                <a16:creationId xmlns:a16="http://schemas.microsoft.com/office/drawing/2014/main" id="{9C6F6B5F-9E01-4BB6-8B49-907EFE365C08}"/>
               </a:ext>
             </a:extLst>
           </p:cNvPr>
@@ -4390,15 +4494,104 @@
           <a:p>
             <a:r>
               <a:rPr lang="en-US" dirty="0"/>
-              <a:t>Demo Time</a:t>
-            </a:r>
+              <a:t>GRPC</a:t>
+            </a:r>
+          </a:p>
+        </p:txBody>
+      </p:sp>
+      <p:sp>
+        <p:nvSpPr>
+          <p:cNvPr id="3" name="Content Placeholder 2">
+            <a:extLst>
+              <a:ext uri="{FF2B5EF4-FFF2-40B4-BE49-F238E27FC236}">
+                <a16:creationId xmlns:a16="http://schemas.microsoft.com/office/drawing/2014/main" id="{843C2D39-93A9-41D3-BBDF-E7FC25B4BC8D}"/>
+              </a:ext>
+            </a:extLst>
+          </p:cNvPr>
+          <p:cNvSpPr>
+            <a:spLocks noGrp="1"/>
+          </p:cNvSpPr>
+          <p:nvPr>
+            <p:ph idx="1"/>
+          </p:nvPr>
+        </p:nvSpPr>
+        <p:spPr/>
+        <p:txBody>
+          <a:bodyPr/>
+          <a:lstStyle/>
+          <a:p>
+            <a:r>
+              <a:rPr lang="en-US" dirty="0"/>
+              <a:t>Built over Protocol Buffers (aka </a:t>
+            </a:r>
+            <a:r>
+              <a:rPr lang="en-US" dirty="0" err="1"/>
+              <a:t>Protobuf</a:t>
+            </a:r>
+            <a:r>
+              <a:rPr lang="en-US" dirty="0"/>
+              <a:t>)</a:t>
+            </a:r>
+          </a:p>
+          <a:p>
+            <a:r>
+              <a:rPr lang="en-US" dirty="0"/>
+              <a:t>Binary encoding</a:t>
+            </a:r>
+          </a:p>
+          <a:p>
+            <a:r>
+              <a:rPr lang="en-US" dirty="0"/>
+              <a:t>Schema based</a:t>
+            </a:r>
+          </a:p>
+          <a:p>
+            <a:r>
+              <a:rPr lang="en-US" dirty="0"/>
+              <a:t>Transmits over HTTP2</a:t>
+            </a:r>
+          </a:p>
+          <a:p>
+            <a:r>
+              <a:rPr lang="en-US" dirty="0"/>
+              <a:t>“Spiritual Successor” to WCF</a:t>
+            </a:r>
+          </a:p>
+          <a:p>
+            <a:pPr lvl="1"/>
+            <a:r>
+              <a:rPr lang="en-US" dirty="0"/>
+              <a:t>Some have said</a:t>
+            </a:r>
+          </a:p>
+          <a:p>
+            <a:r>
+              <a:rPr lang="en-US" dirty="0">
+                <a:hlinkClick r:id="rId2"/>
+              </a:rPr>
+              <a:t>https://grpc.io/</a:t>
+            </a:r>
+            <a:endParaRPr lang="en-US" dirty="0"/>
+          </a:p>
+          <a:p>
+            <a:pPr lvl="1"/>
+            <a:r>
+              <a:rPr lang="en-US" dirty="0">
+                <a:hlinkClick r:id="rId3"/>
+              </a:rPr>
+              <a:t>https://developers.google.com/protocol-buffers/</a:t>
+            </a:r>
+            <a:endParaRPr lang="en-US" dirty="0"/>
+          </a:p>
+          <a:p>
+            <a:endParaRPr lang="en-US" dirty="0"/>
           </a:p>
         </p:txBody>
       </p:sp>
     </p:spTree>
     <p:extLst>
       <p:ext uri="{BB962C8B-B14F-4D97-AF65-F5344CB8AC3E}">
-        <p14:creationId xmlns:p14="http://schemas.microsoft.com/office/powerpoint/2010/main" val="1829669998"/>
+        <p14:creationId xmlns:p14="http://schemas.microsoft.com/office/powerpoint/2010/main" val="3350301512"/>
       </p:ext>
     </p:extLst>
   </p:cSld>
@@ -4427,10 +4620,10 @@
       </p:grpSpPr>
       <p:sp>
         <p:nvSpPr>
-          <p:cNvPr id="2" name="Title 1">
-            <a:extLst>
-              <a:ext uri="{FF2B5EF4-FFF2-40B4-BE49-F238E27FC236}">
-                <a16:creationId xmlns:a16="http://schemas.microsoft.com/office/drawing/2014/main" id="{38FE279D-9820-4F27-8960-296370E99228}"/>
+          <p:cNvPr id="4" name="Title 3">
+            <a:extLst>
+              <a:ext uri="{FF2B5EF4-FFF2-40B4-BE49-F238E27FC236}">
+                <a16:creationId xmlns:a16="http://schemas.microsoft.com/office/drawing/2014/main" id="{77477E1C-3203-466F-9F92-80D59F653A30}"/>
               </a:ext>
             </a:extLst>
           </p:cNvPr>
@@ -4447,74 +4640,16 @@
           <a:lstStyle/>
           <a:p>
             <a:r>
-              <a:rPr lang="en-US" dirty="0" err="1"/>
-              <a:t>SignalR</a:t>
-            </a:r>
-            <a:endParaRPr lang="en-US" dirty="0"/>
-          </a:p>
-        </p:txBody>
-      </p:sp>
-      <p:sp>
-        <p:nvSpPr>
-          <p:cNvPr id="3" name="Content Placeholder 2">
-            <a:extLst>
-              <a:ext uri="{FF2B5EF4-FFF2-40B4-BE49-F238E27FC236}">
-                <a16:creationId xmlns:a16="http://schemas.microsoft.com/office/drawing/2014/main" id="{610CBE65-6A96-407A-816E-1BAC2F1BB934}"/>
-              </a:ext>
-            </a:extLst>
-          </p:cNvPr>
-          <p:cNvSpPr>
-            <a:spLocks noGrp="1"/>
-          </p:cNvSpPr>
-          <p:nvPr>
-            <p:ph idx="1"/>
-          </p:nvPr>
-        </p:nvSpPr>
-        <p:spPr/>
-        <p:txBody>
-          <a:bodyPr/>
-          <a:lstStyle/>
-          <a:p>
-            <a:r>
               <a:rPr lang="en-US" dirty="0"/>
-              <a:t>Push or Pull</a:t>
-            </a:r>
-          </a:p>
-          <a:p>
-            <a:r>
-              <a:rPr lang="en-US" dirty="0"/>
-              <a:t>Tracks connections between server/clients for you</a:t>
-            </a:r>
-          </a:p>
-          <a:p>
-            <a:r>
-              <a:rPr lang="en-US" dirty="0"/>
-              <a:t>JSON or </a:t>
-            </a:r>
-            <a:r>
-              <a:rPr lang="en-US" dirty="0" err="1"/>
-              <a:t>MessagePack</a:t>
-            </a:r>
-            <a:endParaRPr lang="en-US" dirty="0"/>
-          </a:p>
-          <a:p>
-            <a:r>
-              <a:rPr lang="en-US" dirty="0">
-                <a:hlinkClick r:id="rId2"/>
-              </a:rPr>
-              <a:t>https://msgpack.org/</a:t>
-            </a:r>
-            <a:endParaRPr lang="en-US" dirty="0"/>
-          </a:p>
-          <a:p>
-            <a:endParaRPr lang="en-US" dirty="0"/>
+              <a:t>Demo Time</a:t>
+            </a:r>
           </a:p>
         </p:txBody>
       </p:sp>
     </p:spTree>
     <p:extLst>
       <p:ext uri="{BB962C8B-B14F-4D97-AF65-F5344CB8AC3E}">
-        <p14:creationId xmlns:p14="http://schemas.microsoft.com/office/powerpoint/2010/main" val="455678118"/>
+        <p14:creationId xmlns:p14="http://schemas.microsoft.com/office/powerpoint/2010/main" val="1829669998"/>
       </p:ext>
     </p:extLst>
   </p:cSld>

</xml_diff>

<commit_message>
A few changes after another run through
</commit_message>
<xml_diff>
--- a/2020-04-14 ONETUG App Communication Juxtaposition/Presentation.pptx
+++ b/2020-04-14 ONETUG App Communication Juxtaposition/Presentation.pptx
@@ -8,16 +8,15 @@
     <p:sldId id="256" r:id="rId2"/>
     <p:sldId id="264" r:id="rId3"/>
     <p:sldId id="270" r:id="rId4"/>
-    <p:sldId id="266" r:id="rId5"/>
-    <p:sldId id="265" r:id="rId6"/>
-    <p:sldId id="259" r:id="rId7"/>
-    <p:sldId id="267" r:id="rId8"/>
-    <p:sldId id="260" r:id="rId9"/>
-    <p:sldId id="268" r:id="rId10"/>
-    <p:sldId id="261" r:id="rId11"/>
-    <p:sldId id="269" r:id="rId12"/>
-    <p:sldId id="262" r:id="rId13"/>
-    <p:sldId id="257" r:id="rId14"/>
+    <p:sldId id="265" r:id="rId5"/>
+    <p:sldId id="259" r:id="rId6"/>
+    <p:sldId id="267" r:id="rId7"/>
+    <p:sldId id="260" r:id="rId8"/>
+    <p:sldId id="268" r:id="rId9"/>
+    <p:sldId id="261" r:id="rId10"/>
+    <p:sldId id="269" r:id="rId11"/>
+    <p:sldId id="262" r:id="rId12"/>
+    <p:sldId id="257" r:id="rId13"/>
   </p:sldIdLst>
   <p:sldSz cx="12192000" cy="6858000"/>
   <p:notesSz cx="6858000" cy="9144000"/>
@@ -271,7 +270,7 @@
           <a:p>
             <a:fld id="{AB261542-C044-40E3-A832-4BC80D65D98C}" type="datetimeFigureOut">
               <a:rPr lang="en-US" smtClean="0"/>
-              <a:t>4/10/2020</a:t>
+              <a:t>4/11/2020</a:t>
             </a:fld>
             <a:endParaRPr lang="en-US"/>
           </a:p>
@@ -469,7 +468,7 @@
           <a:p>
             <a:fld id="{AB261542-C044-40E3-A832-4BC80D65D98C}" type="datetimeFigureOut">
               <a:rPr lang="en-US" smtClean="0"/>
-              <a:t>4/10/2020</a:t>
+              <a:t>4/11/2020</a:t>
             </a:fld>
             <a:endParaRPr lang="en-US"/>
           </a:p>
@@ -677,7 +676,7 @@
           <a:p>
             <a:fld id="{AB261542-C044-40E3-A832-4BC80D65D98C}" type="datetimeFigureOut">
               <a:rPr lang="en-US" smtClean="0"/>
-              <a:t>4/10/2020</a:t>
+              <a:t>4/11/2020</a:t>
             </a:fld>
             <a:endParaRPr lang="en-US"/>
           </a:p>
@@ -875,7 +874,7 @@
           <a:p>
             <a:fld id="{AB261542-C044-40E3-A832-4BC80D65D98C}" type="datetimeFigureOut">
               <a:rPr lang="en-US" smtClean="0"/>
-              <a:t>4/10/2020</a:t>
+              <a:t>4/11/2020</a:t>
             </a:fld>
             <a:endParaRPr lang="en-US"/>
           </a:p>
@@ -1150,7 +1149,7 @@
           <a:p>
             <a:fld id="{AB261542-C044-40E3-A832-4BC80D65D98C}" type="datetimeFigureOut">
               <a:rPr lang="en-US" smtClean="0"/>
-              <a:t>4/10/2020</a:t>
+              <a:t>4/11/2020</a:t>
             </a:fld>
             <a:endParaRPr lang="en-US"/>
           </a:p>
@@ -1415,7 +1414,7 @@
           <a:p>
             <a:fld id="{AB261542-C044-40E3-A832-4BC80D65D98C}" type="datetimeFigureOut">
               <a:rPr lang="en-US" smtClean="0"/>
-              <a:t>4/10/2020</a:t>
+              <a:t>4/11/2020</a:t>
             </a:fld>
             <a:endParaRPr lang="en-US"/>
           </a:p>
@@ -1827,7 +1826,7 @@
           <a:p>
             <a:fld id="{AB261542-C044-40E3-A832-4BC80D65D98C}" type="datetimeFigureOut">
               <a:rPr lang="en-US" smtClean="0"/>
-              <a:t>4/10/2020</a:t>
+              <a:t>4/11/2020</a:t>
             </a:fld>
             <a:endParaRPr lang="en-US"/>
           </a:p>
@@ -1968,7 +1967,7 @@
           <a:p>
             <a:fld id="{AB261542-C044-40E3-A832-4BC80D65D98C}" type="datetimeFigureOut">
               <a:rPr lang="en-US" smtClean="0"/>
-              <a:t>4/10/2020</a:t>
+              <a:t>4/11/2020</a:t>
             </a:fld>
             <a:endParaRPr lang="en-US"/>
           </a:p>
@@ -2081,7 +2080,7 @@
           <a:p>
             <a:fld id="{AB261542-C044-40E3-A832-4BC80D65D98C}" type="datetimeFigureOut">
               <a:rPr lang="en-US" smtClean="0"/>
-              <a:t>4/10/2020</a:t>
+              <a:t>4/11/2020</a:t>
             </a:fld>
             <a:endParaRPr lang="en-US"/>
           </a:p>
@@ -2392,7 +2391,7 @@
           <a:p>
             <a:fld id="{AB261542-C044-40E3-A832-4BC80D65D98C}" type="datetimeFigureOut">
               <a:rPr lang="en-US" smtClean="0"/>
-              <a:t>4/10/2020</a:t>
+              <a:t>4/11/2020</a:t>
             </a:fld>
             <a:endParaRPr lang="en-US"/>
           </a:p>
@@ -2680,7 +2679,7 @@
           <a:p>
             <a:fld id="{AB261542-C044-40E3-A832-4BC80D65D98C}" type="datetimeFigureOut">
               <a:rPr lang="en-US" smtClean="0"/>
-              <a:t>4/10/2020</a:t>
+              <a:t>4/11/2020</a:t>
             </a:fld>
             <a:endParaRPr lang="en-US"/>
           </a:p>
@@ -2921,7 +2920,7 @@
           <a:p>
             <a:fld id="{AB261542-C044-40E3-A832-4BC80D65D98C}" type="datetimeFigureOut">
               <a:rPr lang="en-US" smtClean="0"/>
-              <a:t>4/10/2020</a:t>
+              <a:t>4/11/2020</a:t>
             </a:fld>
             <a:endParaRPr lang="en-US"/>
           </a:p>
@@ -3395,13 +3394,16 @@
           <a:p>
             <a:r>
               <a:rPr lang="en-US" dirty="0"/>
-              <a:t>JSON “vs” GRPC “vs” </a:t>
+              <a:t>JSON vs GRPC vs </a:t>
             </a:r>
             <a:r>
               <a:rPr lang="en-US" dirty="0" err="1"/>
               <a:t>SignalR</a:t>
             </a:r>
-            <a:endParaRPr lang="en-US" dirty="0"/>
+            <a:r>
+              <a:rPr lang="en-US" dirty="0"/>
+              <a:t> Core</a:t>
+            </a:r>
           </a:p>
         </p:txBody>
       </p:sp>
@@ -3437,10 +3439,10 @@
       </p:grpSpPr>
       <p:sp>
         <p:nvSpPr>
-          <p:cNvPr id="2" name="Title 1">
-            <a:extLst>
-              <a:ext uri="{FF2B5EF4-FFF2-40B4-BE49-F238E27FC236}">
-                <a16:creationId xmlns:a16="http://schemas.microsoft.com/office/drawing/2014/main" id="{38FE279D-9820-4F27-8960-296370E99228}"/>
+          <p:cNvPr id="4" name="Title 3">
+            <a:extLst>
+              <a:ext uri="{FF2B5EF4-FFF2-40B4-BE49-F238E27FC236}">
+                <a16:creationId xmlns:a16="http://schemas.microsoft.com/office/drawing/2014/main" id="{77477E1C-3203-466F-9F92-80D59F653A30}"/>
               </a:ext>
             </a:extLst>
           </p:cNvPr>
@@ -3457,85 +3459,16 @@
           <a:lstStyle/>
           <a:p>
             <a:r>
-              <a:rPr lang="en-US" dirty="0" err="1"/>
-              <a:t>SignalR</a:t>
-            </a:r>
-            <a:endParaRPr lang="en-US" dirty="0"/>
-          </a:p>
-        </p:txBody>
-      </p:sp>
-      <p:sp>
-        <p:nvSpPr>
-          <p:cNvPr id="3" name="Content Placeholder 2">
-            <a:extLst>
-              <a:ext uri="{FF2B5EF4-FFF2-40B4-BE49-F238E27FC236}">
-                <a16:creationId xmlns:a16="http://schemas.microsoft.com/office/drawing/2014/main" id="{610CBE65-6A96-407A-816E-1BAC2F1BB934}"/>
-              </a:ext>
-            </a:extLst>
-          </p:cNvPr>
-          <p:cNvSpPr>
-            <a:spLocks noGrp="1"/>
-          </p:cNvSpPr>
-          <p:nvPr>
-            <p:ph idx="1"/>
-          </p:nvPr>
-        </p:nvSpPr>
-        <p:spPr/>
-        <p:txBody>
-          <a:bodyPr/>
-          <a:lstStyle/>
-          <a:p>
-            <a:r>
-              <a:rPr lang="en-US" dirty="0"/>
-              <a:t>Push or Pull</a:t>
-            </a:r>
-          </a:p>
-          <a:p>
-            <a:r>
-              <a:rPr lang="en-US" dirty="0"/>
-              <a:t>Uses </a:t>
-            </a:r>
-            <a:r>
-              <a:rPr lang="en-US" dirty="0" err="1"/>
-              <a:t>WebSockets</a:t>
-            </a:r>
-            <a:endParaRPr lang="en-US" dirty="0"/>
-          </a:p>
-          <a:p>
-            <a:r>
-              <a:rPr lang="en-US" dirty="0"/>
-              <a:t>Tracks connections between server/clients for you</a:t>
-            </a:r>
-          </a:p>
-          <a:p>
-            <a:r>
-              <a:rPr lang="en-US" dirty="0"/>
-              <a:t>JSON or </a:t>
-            </a:r>
-            <a:r>
-              <a:rPr lang="en-US" dirty="0" err="1"/>
-              <a:t>MessagePack</a:t>
-            </a:r>
-            <a:endParaRPr lang="en-US" dirty="0"/>
-          </a:p>
-          <a:p>
-            <a:r>
-              <a:rPr lang="en-US" dirty="0">
-                <a:hlinkClick r:id="rId2"/>
-              </a:rPr>
-              <a:t>https://msgpack.org/</a:t>
-            </a:r>
-            <a:endParaRPr lang="en-US" dirty="0"/>
-          </a:p>
-          <a:p>
-            <a:endParaRPr lang="en-US" dirty="0"/>
+              <a:rPr lang="en-US" dirty="0"/>
+              <a:t>Demo Time</a:t>
+            </a:r>
           </a:p>
         </p:txBody>
       </p:sp>
     </p:spTree>
     <p:extLst>
       <p:ext uri="{BB962C8B-B14F-4D97-AF65-F5344CB8AC3E}">
-        <p14:creationId xmlns:p14="http://schemas.microsoft.com/office/powerpoint/2010/main" val="455678118"/>
+        <p14:creationId xmlns:p14="http://schemas.microsoft.com/office/powerpoint/2010/main" val="2955267194"/>
       </p:ext>
     </p:extLst>
   </p:cSld>
@@ -3564,64 +3497,6 @@
       </p:grpSpPr>
       <p:sp>
         <p:nvSpPr>
-          <p:cNvPr id="4" name="Title 3">
-            <a:extLst>
-              <a:ext uri="{FF2B5EF4-FFF2-40B4-BE49-F238E27FC236}">
-                <a16:creationId xmlns:a16="http://schemas.microsoft.com/office/drawing/2014/main" id="{77477E1C-3203-466F-9F92-80D59F653A30}"/>
-              </a:ext>
-            </a:extLst>
-          </p:cNvPr>
-          <p:cNvSpPr>
-            <a:spLocks noGrp="1"/>
-          </p:cNvSpPr>
-          <p:nvPr>
-            <p:ph type="title"/>
-          </p:nvPr>
-        </p:nvSpPr>
-        <p:spPr/>
-        <p:txBody>
-          <a:bodyPr/>
-          <a:lstStyle/>
-          <a:p>
-            <a:r>
-              <a:rPr lang="en-US" dirty="0"/>
-              <a:t>Demo Time</a:t>
-            </a:r>
-          </a:p>
-        </p:txBody>
-      </p:sp>
-    </p:spTree>
-    <p:extLst>
-      <p:ext uri="{BB962C8B-B14F-4D97-AF65-F5344CB8AC3E}">
-        <p14:creationId xmlns:p14="http://schemas.microsoft.com/office/powerpoint/2010/main" val="2955267194"/>
-      </p:ext>
-    </p:extLst>
-  </p:cSld>
-  <p:clrMapOvr>
-    <a:masterClrMapping/>
-  </p:clrMapOvr>
-</p:sld>
-</file>
-
-<file path=ppt/slides/slide12.xml><?xml version="1.0" encoding="utf-8"?>
-<p:sld xmlns:a="http://schemas.openxmlformats.org/drawingml/2006/main" xmlns:r="http://schemas.openxmlformats.org/officeDocument/2006/relationships" xmlns:p="http://schemas.openxmlformats.org/presentationml/2006/main">
-  <p:cSld>
-    <p:spTree>
-      <p:nvGrpSpPr>
-        <p:cNvPr id="1" name=""/>
-        <p:cNvGrpSpPr/>
-        <p:nvPr/>
-      </p:nvGrpSpPr>
-      <p:grpSpPr>
-        <a:xfrm>
-          <a:off x="0" y="0"/>
-          <a:ext cx="0" cy="0"/>
-          <a:chOff x="0" y="0"/>
-          <a:chExt cx="0" cy="0"/>
-        </a:xfrm>
-      </p:grpSpPr>
-      <p:sp>
-        <p:nvSpPr>
           <p:cNvPr id="2" name="Title 1">
             <a:extLst>
               <a:ext uri="{FF2B5EF4-FFF2-40B4-BE49-F238E27FC236}">
@@ -3715,7 +3590,7 @@
 </p:sld>
 </file>
 
-<file path=ppt/slides/slide13.xml><?xml version="1.0" encoding="utf-8"?>
+<file path=ppt/slides/slide12.xml><?xml version="1.0" encoding="utf-8"?>
 <p:sld xmlns:a="http://schemas.openxmlformats.org/drawingml/2006/main" xmlns:r="http://schemas.openxmlformats.org/officeDocument/2006/relationships" xmlns:p="http://schemas.openxmlformats.org/presentationml/2006/main">
   <p:cSld>
     <p:spTree>
@@ -3878,6 +3753,20 @@
           <a:p>
             <a:r>
               <a:rPr lang="en-US" dirty="0"/>
+              <a:t>JSON vs GRPC vs </a:t>
+            </a:r>
+            <a:r>
+              <a:rPr lang="en-US" dirty="0" err="1"/>
+              <a:t>SignalR</a:t>
+            </a:r>
+            <a:r>
+              <a:rPr lang="en-US" dirty="0"/>
+              <a:t> Core</a:t>
+            </a:r>
+          </a:p>
+          <a:p>
+            <a:r>
+              <a:rPr lang="en-US" dirty="0"/>
               <a:t>Comparing Pros/Cons of different technologies</a:t>
             </a:r>
           </a:p>
@@ -4078,7 +3967,7 @@
           <p:cNvPr id="2" name="Title 1">
             <a:extLst>
               <a:ext uri="{FF2B5EF4-FFF2-40B4-BE49-F238E27FC236}">
-                <a16:creationId xmlns:a16="http://schemas.microsoft.com/office/drawing/2014/main" id="{410FA65C-188E-431C-8FE4-7861553E7D5D}"/>
+                <a16:creationId xmlns:a16="http://schemas.microsoft.com/office/drawing/2014/main" id="{29F17621-BC0E-46DF-9451-5C5D46EB3FC4}"/>
               </a:ext>
             </a:extLst>
           </p:cNvPr>
@@ -4096,7 +3985,7 @@
           <a:p>
             <a:r>
               <a:rPr lang="en-US" dirty="0"/>
-              <a:t>What do they all have in common?</a:t>
+              <a:t>When would I use each?</a:t>
             </a:r>
           </a:p>
         </p:txBody>
@@ -4106,7 +3995,7 @@
           <p:cNvPr id="3" name="Content Placeholder 2">
             <a:extLst>
               <a:ext uri="{FF2B5EF4-FFF2-40B4-BE49-F238E27FC236}">
-                <a16:creationId xmlns:a16="http://schemas.microsoft.com/office/drawing/2014/main" id="{848C1CBD-89FE-4BDA-BF0A-A7FC47094962}"/>
+                <a16:creationId xmlns:a16="http://schemas.microsoft.com/office/drawing/2014/main" id="{09FDBC3C-C106-42A7-AC53-60DD4C9CBAD1}"/>
               </a:ext>
             </a:extLst>
           </p:cNvPr>
@@ -4124,10 +4013,74 @@
           <a:p>
             <a:r>
               <a:rPr lang="en-US" dirty="0"/>
-              <a:t>Cross Platform</a:t>
-            </a:r>
-          </a:p>
-          <a:p>
+              <a:t>JSON with REST</a:t>
+            </a:r>
+          </a:p>
+          <a:p>
+            <a:pPr lvl="1"/>
+            <a:r>
+              <a:rPr lang="en-US" dirty="0"/>
+              <a:t>Public Facing APIs</a:t>
+            </a:r>
+          </a:p>
+          <a:p>
+            <a:r>
+              <a:rPr lang="en-US" dirty="0"/>
+              <a:t>GRPC</a:t>
+            </a:r>
+          </a:p>
+          <a:p>
+            <a:pPr lvl="1"/>
+            <a:r>
+              <a:rPr lang="en-US" dirty="0"/>
+              <a:t>Internal app messaging</a:t>
+            </a:r>
+          </a:p>
+          <a:p>
+            <a:pPr lvl="1"/>
+            <a:r>
+              <a:rPr lang="en-US" dirty="0"/>
+              <a:t>Microservices</a:t>
+            </a:r>
+          </a:p>
+          <a:p>
+            <a:pPr lvl="1"/>
+            <a:r>
+              <a:rPr lang="en-US" dirty="0"/>
+              <a:t>When performance is most important feature (video games, </a:t>
+            </a:r>
+            <a:r>
+              <a:rPr lang="en-US" dirty="0" err="1"/>
+              <a:t>etc</a:t>
+            </a:r>
+            <a:r>
+              <a:rPr lang="en-US" dirty="0"/>
+              <a:t>)</a:t>
+            </a:r>
+          </a:p>
+          <a:p>
+            <a:r>
+              <a:rPr lang="en-US" dirty="0" err="1"/>
+              <a:t>SignalR</a:t>
+            </a:r>
+            <a:endParaRPr lang="en-US" dirty="0"/>
+          </a:p>
+          <a:p>
+            <a:pPr lvl="1"/>
+            <a:r>
+              <a:rPr lang="en-US" dirty="0"/>
+              <a:t>When push architecture is better</a:t>
+            </a:r>
+          </a:p>
+          <a:p>
+            <a:pPr lvl="1"/>
+            <a:r>
+              <a:rPr lang="en-US" dirty="0"/>
+              <a:t>When you control server and client</a:t>
+            </a:r>
+          </a:p>
+          <a:p>
+            <a:pPr lvl="1"/>
             <a:endParaRPr lang="en-US" dirty="0"/>
           </a:p>
         </p:txBody>
@@ -4135,7 +4088,7 @@
     </p:spTree>
     <p:extLst>
       <p:ext uri="{BB962C8B-B14F-4D97-AF65-F5344CB8AC3E}">
-        <p14:creationId xmlns:p14="http://schemas.microsoft.com/office/powerpoint/2010/main" val="3031138637"/>
+        <p14:creationId xmlns:p14="http://schemas.microsoft.com/office/powerpoint/2010/main" val="76572123"/>
       </p:ext>
     </p:extLst>
   </p:cSld>
@@ -4167,7 +4120,7 @@
           <p:cNvPr id="2" name="Title 1">
             <a:extLst>
               <a:ext uri="{FF2B5EF4-FFF2-40B4-BE49-F238E27FC236}">
-                <a16:creationId xmlns:a16="http://schemas.microsoft.com/office/drawing/2014/main" id="{29F17621-BC0E-46DF-9451-5C5D46EB3FC4}"/>
+                <a16:creationId xmlns:a16="http://schemas.microsoft.com/office/drawing/2014/main" id="{33518422-075D-4BD6-92E7-C861C3E35C20}"/>
               </a:ext>
             </a:extLst>
           </p:cNvPr>
@@ -4185,7 +4138,7 @@
           <a:p>
             <a:r>
               <a:rPr lang="en-US" dirty="0"/>
-              <a:t>When would I use each?</a:t>
+              <a:t>REST with JSON</a:t>
             </a:r>
           </a:p>
         </p:txBody>
@@ -4195,7 +4148,7 @@
           <p:cNvPr id="3" name="Content Placeholder 2">
             <a:extLst>
               <a:ext uri="{FF2B5EF4-FFF2-40B4-BE49-F238E27FC236}">
-                <a16:creationId xmlns:a16="http://schemas.microsoft.com/office/drawing/2014/main" id="{09FDBC3C-C106-42A7-AC53-60DD4C9CBAD1}"/>
+                <a16:creationId xmlns:a16="http://schemas.microsoft.com/office/drawing/2014/main" id="{F8D74C80-759E-4812-B577-358F8BB4B7F8}"/>
               </a:ext>
             </a:extLst>
           </p:cNvPr>
@@ -4213,82 +4166,27 @@
           <a:p>
             <a:r>
               <a:rPr lang="en-US" dirty="0"/>
-              <a:t>JSON with REST</a:t>
-            </a:r>
-          </a:p>
-          <a:p>
-            <a:pPr lvl="1"/>
-            <a:r>
-              <a:rPr lang="en-US" dirty="0"/>
-              <a:t>Public Facing APIs</a:t>
-            </a:r>
-          </a:p>
-          <a:p>
-            <a:r>
-              <a:rPr lang="en-US" dirty="0"/>
-              <a:t>GRPC</a:t>
-            </a:r>
-          </a:p>
-          <a:p>
-            <a:pPr lvl="1"/>
-            <a:r>
-              <a:rPr lang="en-US" dirty="0"/>
-              <a:t>Internal app messaging</a:t>
-            </a:r>
-          </a:p>
-          <a:p>
-            <a:pPr lvl="1"/>
-            <a:r>
-              <a:rPr lang="en-US" dirty="0"/>
-              <a:t>Microservices</a:t>
-            </a:r>
-          </a:p>
-          <a:p>
-            <a:pPr lvl="1"/>
-            <a:r>
-              <a:rPr lang="en-US" dirty="0"/>
-              <a:t>When performance is most important feature (video games, </a:t>
-            </a:r>
-            <a:r>
-              <a:rPr lang="en-US" dirty="0" err="1"/>
-              <a:t>etc</a:t>
-            </a:r>
-            <a:r>
-              <a:rPr lang="en-US" dirty="0"/>
-              <a:t>)</a:t>
-            </a:r>
-          </a:p>
-          <a:p>
-            <a:r>
-              <a:rPr lang="en-US" dirty="0" err="1"/>
-              <a:t>SignalR</a:t>
-            </a:r>
-            <a:endParaRPr lang="en-US" dirty="0"/>
-          </a:p>
-          <a:p>
-            <a:pPr lvl="1"/>
-            <a:r>
-              <a:rPr lang="en-US" dirty="0"/>
-              <a:t>When push architecture is better</a:t>
-            </a:r>
-          </a:p>
-          <a:p>
-            <a:pPr lvl="1"/>
-            <a:r>
-              <a:rPr lang="en-US" dirty="0"/>
-              <a:t>When you control server and client</a:t>
-            </a:r>
-          </a:p>
-          <a:p>
-            <a:pPr lvl="1"/>
-            <a:endParaRPr lang="en-US" dirty="0"/>
+              <a:t>“Traditional”</a:t>
+            </a:r>
+          </a:p>
+          <a:p>
+            <a:r>
+              <a:rPr lang="en-US" dirty="0"/>
+              <a:t>Loosely coupled</a:t>
+            </a:r>
+          </a:p>
+          <a:p>
+            <a:r>
+              <a:rPr lang="en-US" dirty="0"/>
+              <a:t>Human Readable</a:t>
+            </a:r>
           </a:p>
         </p:txBody>
       </p:sp>
     </p:spTree>
     <p:extLst>
       <p:ext uri="{BB962C8B-B14F-4D97-AF65-F5344CB8AC3E}">
-        <p14:creationId xmlns:p14="http://schemas.microsoft.com/office/powerpoint/2010/main" val="76572123"/>
+        <p14:creationId xmlns:p14="http://schemas.microsoft.com/office/powerpoint/2010/main" val="1727133521"/>
       </p:ext>
     </p:extLst>
   </p:cSld>
@@ -4317,10 +4215,10 @@
       </p:grpSpPr>
       <p:sp>
         <p:nvSpPr>
-          <p:cNvPr id="2" name="Title 1">
-            <a:extLst>
-              <a:ext uri="{FF2B5EF4-FFF2-40B4-BE49-F238E27FC236}">
-                <a16:creationId xmlns:a16="http://schemas.microsoft.com/office/drawing/2014/main" id="{33518422-075D-4BD6-92E7-C861C3E35C20}"/>
+          <p:cNvPr id="4" name="Title 3">
+            <a:extLst>
+              <a:ext uri="{FF2B5EF4-FFF2-40B4-BE49-F238E27FC236}">
+                <a16:creationId xmlns:a16="http://schemas.microsoft.com/office/drawing/2014/main" id="{77477E1C-3203-466F-9F92-80D59F653A30}"/>
               </a:ext>
             </a:extLst>
           </p:cNvPr>
@@ -4338,47 +4236,7 @@
           <a:p>
             <a:r>
               <a:rPr lang="en-US" dirty="0"/>
-              <a:t>REST with JSON</a:t>
-            </a:r>
-          </a:p>
-        </p:txBody>
-      </p:sp>
-      <p:sp>
-        <p:nvSpPr>
-          <p:cNvPr id="3" name="Content Placeholder 2">
-            <a:extLst>
-              <a:ext uri="{FF2B5EF4-FFF2-40B4-BE49-F238E27FC236}">
-                <a16:creationId xmlns:a16="http://schemas.microsoft.com/office/drawing/2014/main" id="{F8D74C80-759E-4812-B577-358F8BB4B7F8}"/>
-              </a:ext>
-            </a:extLst>
-          </p:cNvPr>
-          <p:cNvSpPr>
-            <a:spLocks noGrp="1"/>
-          </p:cNvSpPr>
-          <p:nvPr>
-            <p:ph idx="1"/>
-          </p:nvPr>
-        </p:nvSpPr>
-        <p:spPr/>
-        <p:txBody>
-          <a:bodyPr/>
-          <a:lstStyle/>
-          <a:p>
-            <a:r>
-              <a:rPr lang="en-US" dirty="0"/>
-              <a:t>“Traditional”</a:t>
-            </a:r>
-          </a:p>
-          <a:p>
-            <a:r>
-              <a:rPr lang="en-US" dirty="0"/>
-              <a:t>Loosely coupled</a:t>
-            </a:r>
-          </a:p>
-          <a:p>
-            <a:r>
-              <a:rPr lang="en-US" dirty="0"/>
-              <a:t>Human Readable</a:t>
+              <a:t>Demo Time</a:t>
             </a:r>
           </a:p>
         </p:txBody>
@@ -4386,7 +4244,7 @@
     </p:spTree>
     <p:extLst>
       <p:ext uri="{BB962C8B-B14F-4D97-AF65-F5344CB8AC3E}">
-        <p14:creationId xmlns:p14="http://schemas.microsoft.com/office/powerpoint/2010/main" val="1727133521"/>
+        <p14:creationId xmlns:p14="http://schemas.microsoft.com/office/powerpoint/2010/main" val="2344446595"/>
       </p:ext>
     </p:extLst>
   </p:cSld>
@@ -4415,10 +4273,10 @@
       </p:grpSpPr>
       <p:sp>
         <p:nvSpPr>
-          <p:cNvPr id="4" name="Title 3">
-            <a:extLst>
-              <a:ext uri="{FF2B5EF4-FFF2-40B4-BE49-F238E27FC236}">
-                <a16:creationId xmlns:a16="http://schemas.microsoft.com/office/drawing/2014/main" id="{77477E1C-3203-466F-9F92-80D59F653A30}"/>
+          <p:cNvPr id="2" name="Title 1">
+            <a:extLst>
+              <a:ext uri="{FF2B5EF4-FFF2-40B4-BE49-F238E27FC236}">
+                <a16:creationId xmlns:a16="http://schemas.microsoft.com/office/drawing/2014/main" id="{9C6F6B5F-9E01-4BB6-8B49-907EFE365C08}"/>
               </a:ext>
             </a:extLst>
           </p:cNvPr>
@@ -4436,15 +4294,104 @@
           <a:p>
             <a:r>
               <a:rPr lang="en-US" dirty="0"/>
-              <a:t>Demo Time</a:t>
-            </a:r>
+              <a:t>GRPC</a:t>
+            </a:r>
+          </a:p>
+        </p:txBody>
+      </p:sp>
+      <p:sp>
+        <p:nvSpPr>
+          <p:cNvPr id="3" name="Content Placeholder 2">
+            <a:extLst>
+              <a:ext uri="{FF2B5EF4-FFF2-40B4-BE49-F238E27FC236}">
+                <a16:creationId xmlns:a16="http://schemas.microsoft.com/office/drawing/2014/main" id="{843C2D39-93A9-41D3-BBDF-E7FC25B4BC8D}"/>
+              </a:ext>
+            </a:extLst>
+          </p:cNvPr>
+          <p:cNvSpPr>
+            <a:spLocks noGrp="1"/>
+          </p:cNvSpPr>
+          <p:nvPr>
+            <p:ph idx="1"/>
+          </p:nvPr>
+        </p:nvSpPr>
+        <p:spPr/>
+        <p:txBody>
+          <a:bodyPr/>
+          <a:lstStyle/>
+          <a:p>
+            <a:r>
+              <a:rPr lang="en-US" dirty="0"/>
+              <a:t>Built over Protocol Buffers (aka </a:t>
+            </a:r>
+            <a:r>
+              <a:rPr lang="en-US" dirty="0" err="1"/>
+              <a:t>Protobuf</a:t>
+            </a:r>
+            <a:r>
+              <a:rPr lang="en-US" dirty="0"/>
+              <a:t>)</a:t>
+            </a:r>
+          </a:p>
+          <a:p>
+            <a:r>
+              <a:rPr lang="en-US" dirty="0"/>
+              <a:t>Binary encoding</a:t>
+            </a:r>
+          </a:p>
+          <a:p>
+            <a:r>
+              <a:rPr lang="en-US" dirty="0"/>
+              <a:t>Schema based</a:t>
+            </a:r>
+          </a:p>
+          <a:p>
+            <a:r>
+              <a:rPr lang="en-US" dirty="0"/>
+              <a:t>Transmits over HTTP2</a:t>
+            </a:r>
+          </a:p>
+          <a:p>
+            <a:r>
+              <a:rPr lang="en-US" dirty="0"/>
+              <a:t>“Spiritual Successor” to WCF</a:t>
+            </a:r>
+          </a:p>
+          <a:p>
+            <a:pPr lvl="1"/>
+            <a:r>
+              <a:rPr lang="en-US" dirty="0"/>
+              <a:t>Some have said</a:t>
+            </a:r>
+          </a:p>
+          <a:p>
+            <a:r>
+              <a:rPr lang="en-US" dirty="0">
+                <a:hlinkClick r:id="rId2"/>
+              </a:rPr>
+              <a:t>https://grpc.io/</a:t>
+            </a:r>
+            <a:endParaRPr lang="en-US" dirty="0"/>
+          </a:p>
+          <a:p>
+            <a:pPr lvl="1"/>
+            <a:r>
+              <a:rPr lang="en-US" dirty="0">
+                <a:hlinkClick r:id="rId3"/>
+              </a:rPr>
+              <a:t>https://developers.google.com/protocol-buffers/</a:t>
+            </a:r>
+            <a:endParaRPr lang="en-US" dirty="0"/>
+          </a:p>
+          <a:p>
+            <a:endParaRPr lang="en-US" dirty="0"/>
           </a:p>
         </p:txBody>
       </p:sp>
     </p:spTree>
     <p:extLst>
       <p:ext uri="{BB962C8B-B14F-4D97-AF65-F5344CB8AC3E}">
-        <p14:creationId xmlns:p14="http://schemas.microsoft.com/office/powerpoint/2010/main" val="2344446595"/>
+        <p14:creationId xmlns:p14="http://schemas.microsoft.com/office/powerpoint/2010/main" val="3350301512"/>
       </p:ext>
     </p:extLst>
   </p:cSld>
@@ -4473,10 +4420,10 @@
       </p:grpSpPr>
       <p:sp>
         <p:nvSpPr>
-          <p:cNvPr id="2" name="Title 1">
-            <a:extLst>
-              <a:ext uri="{FF2B5EF4-FFF2-40B4-BE49-F238E27FC236}">
-                <a16:creationId xmlns:a16="http://schemas.microsoft.com/office/drawing/2014/main" id="{9C6F6B5F-9E01-4BB6-8B49-907EFE365C08}"/>
+          <p:cNvPr id="4" name="Title 3">
+            <a:extLst>
+              <a:ext uri="{FF2B5EF4-FFF2-40B4-BE49-F238E27FC236}">
+                <a16:creationId xmlns:a16="http://schemas.microsoft.com/office/drawing/2014/main" id="{77477E1C-3203-466F-9F92-80D59F653A30}"/>
               </a:ext>
             </a:extLst>
           </p:cNvPr>
@@ -4494,104 +4441,15 @@
           <a:p>
             <a:r>
               <a:rPr lang="en-US" dirty="0"/>
-              <a:t>GRPC</a:t>
-            </a:r>
-          </a:p>
-        </p:txBody>
-      </p:sp>
-      <p:sp>
-        <p:nvSpPr>
-          <p:cNvPr id="3" name="Content Placeholder 2">
-            <a:extLst>
-              <a:ext uri="{FF2B5EF4-FFF2-40B4-BE49-F238E27FC236}">
-                <a16:creationId xmlns:a16="http://schemas.microsoft.com/office/drawing/2014/main" id="{843C2D39-93A9-41D3-BBDF-E7FC25B4BC8D}"/>
-              </a:ext>
-            </a:extLst>
-          </p:cNvPr>
-          <p:cNvSpPr>
-            <a:spLocks noGrp="1"/>
-          </p:cNvSpPr>
-          <p:nvPr>
-            <p:ph idx="1"/>
-          </p:nvPr>
-        </p:nvSpPr>
-        <p:spPr/>
-        <p:txBody>
-          <a:bodyPr/>
-          <a:lstStyle/>
-          <a:p>
-            <a:r>
-              <a:rPr lang="en-US" dirty="0"/>
-              <a:t>Built over Protocol Buffers (aka </a:t>
-            </a:r>
-            <a:r>
-              <a:rPr lang="en-US" dirty="0" err="1"/>
-              <a:t>Protobuf</a:t>
-            </a:r>
-            <a:r>
-              <a:rPr lang="en-US" dirty="0"/>
-              <a:t>)</a:t>
-            </a:r>
-          </a:p>
-          <a:p>
-            <a:r>
-              <a:rPr lang="en-US" dirty="0"/>
-              <a:t>Binary encoding</a:t>
-            </a:r>
-          </a:p>
-          <a:p>
-            <a:r>
-              <a:rPr lang="en-US" dirty="0"/>
-              <a:t>Schema based</a:t>
-            </a:r>
-          </a:p>
-          <a:p>
-            <a:r>
-              <a:rPr lang="en-US" dirty="0"/>
-              <a:t>Transmits over HTTP2</a:t>
-            </a:r>
-          </a:p>
-          <a:p>
-            <a:r>
-              <a:rPr lang="en-US" dirty="0"/>
-              <a:t>“Spiritual Successor” to WCF</a:t>
-            </a:r>
-          </a:p>
-          <a:p>
-            <a:pPr lvl="1"/>
-            <a:r>
-              <a:rPr lang="en-US" dirty="0"/>
-              <a:t>Some have said</a:t>
-            </a:r>
-          </a:p>
-          <a:p>
-            <a:r>
-              <a:rPr lang="en-US" dirty="0">
-                <a:hlinkClick r:id="rId2"/>
-              </a:rPr>
-              <a:t>https://grpc.io/</a:t>
-            </a:r>
-            <a:endParaRPr lang="en-US" dirty="0"/>
-          </a:p>
-          <a:p>
-            <a:pPr lvl="1"/>
-            <a:r>
-              <a:rPr lang="en-US" dirty="0">
-                <a:hlinkClick r:id="rId3"/>
-              </a:rPr>
-              <a:t>https://developers.google.com/protocol-buffers/</a:t>
-            </a:r>
-            <a:endParaRPr lang="en-US" dirty="0"/>
-          </a:p>
-          <a:p>
-            <a:endParaRPr lang="en-US" dirty="0"/>
+              <a:t>Demo Time</a:t>
+            </a:r>
           </a:p>
         </p:txBody>
       </p:sp>
     </p:spTree>
     <p:extLst>
       <p:ext uri="{BB962C8B-B14F-4D97-AF65-F5344CB8AC3E}">
-        <p14:creationId xmlns:p14="http://schemas.microsoft.com/office/powerpoint/2010/main" val="3350301512"/>
+        <p14:creationId xmlns:p14="http://schemas.microsoft.com/office/powerpoint/2010/main" val="1829669998"/>
       </p:ext>
     </p:extLst>
   </p:cSld>
@@ -4620,10 +4478,10 @@
       </p:grpSpPr>
       <p:sp>
         <p:nvSpPr>
-          <p:cNvPr id="4" name="Title 3">
-            <a:extLst>
-              <a:ext uri="{FF2B5EF4-FFF2-40B4-BE49-F238E27FC236}">
-                <a16:creationId xmlns:a16="http://schemas.microsoft.com/office/drawing/2014/main" id="{77477E1C-3203-466F-9F92-80D59F653A30}"/>
+          <p:cNvPr id="2" name="Title 1">
+            <a:extLst>
+              <a:ext uri="{FF2B5EF4-FFF2-40B4-BE49-F238E27FC236}">
+                <a16:creationId xmlns:a16="http://schemas.microsoft.com/office/drawing/2014/main" id="{38FE279D-9820-4F27-8960-296370E99228}"/>
               </a:ext>
             </a:extLst>
           </p:cNvPr>
@@ -4640,16 +4498,89 @@
           <a:lstStyle/>
           <a:p>
             <a:r>
-              <a:rPr lang="en-US" dirty="0"/>
-              <a:t>Demo Time</a:t>
-            </a:r>
+              <a:rPr lang="en-US" dirty="0" err="1"/>
+              <a:t>SignalR</a:t>
+            </a:r>
+            <a:r>
+              <a:rPr lang="en-US"/>
+              <a:t> Core</a:t>
+            </a:r>
+            <a:endParaRPr lang="en-US" dirty="0"/>
+          </a:p>
+        </p:txBody>
+      </p:sp>
+      <p:sp>
+        <p:nvSpPr>
+          <p:cNvPr id="3" name="Content Placeholder 2">
+            <a:extLst>
+              <a:ext uri="{FF2B5EF4-FFF2-40B4-BE49-F238E27FC236}">
+                <a16:creationId xmlns:a16="http://schemas.microsoft.com/office/drawing/2014/main" id="{610CBE65-6A96-407A-816E-1BAC2F1BB934}"/>
+              </a:ext>
+            </a:extLst>
+          </p:cNvPr>
+          <p:cNvSpPr>
+            <a:spLocks noGrp="1"/>
+          </p:cNvSpPr>
+          <p:nvPr>
+            <p:ph idx="1"/>
+          </p:nvPr>
+        </p:nvSpPr>
+        <p:spPr/>
+        <p:txBody>
+          <a:bodyPr/>
+          <a:lstStyle/>
+          <a:p>
+            <a:r>
+              <a:rPr lang="en-US" dirty="0"/>
+              <a:t>Push vs Pull</a:t>
+            </a:r>
+          </a:p>
+          <a:p>
+            <a:r>
+              <a:rPr lang="en-US" dirty="0"/>
+              <a:t>Uses </a:t>
+            </a:r>
+            <a:r>
+              <a:rPr lang="en-US" dirty="0" err="1"/>
+              <a:t>WebSockets</a:t>
+            </a:r>
+            <a:endParaRPr lang="en-US" dirty="0"/>
+          </a:p>
+          <a:p>
+            <a:r>
+              <a:rPr lang="en-US" dirty="0"/>
+              <a:t>Tracks connections between server/clients for you</a:t>
+            </a:r>
+          </a:p>
+          <a:p>
+            <a:r>
+              <a:rPr lang="en-US" dirty="0"/>
+              <a:t>JSON or </a:t>
+            </a:r>
+            <a:r>
+              <a:rPr lang="en-US" dirty="0" err="1"/>
+              <a:t>MessagePack</a:t>
+            </a:r>
+            <a:endParaRPr lang="en-US" dirty="0"/>
+          </a:p>
+          <a:p>
+            <a:r>
+              <a:rPr lang="en-US" dirty="0">
+                <a:hlinkClick r:id="rId2"/>
+              </a:rPr>
+              <a:t>https://msgpack.org/</a:t>
+            </a:r>
+            <a:endParaRPr lang="en-US" dirty="0"/>
+          </a:p>
+          <a:p>
+            <a:endParaRPr lang="en-US" dirty="0"/>
           </a:p>
         </p:txBody>
       </p:sp>
     </p:spTree>
     <p:extLst>
       <p:ext uri="{BB962C8B-B14F-4D97-AF65-F5344CB8AC3E}">
-        <p14:creationId xmlns:p14="http://schemas.microsoft.com/office/powerpoint/2010/main" val="1829669998"/>
+        <p14:creationId xmlns:p14="http://schemas.microsoft.com/office/powerpoint/2010/main" val="455678118"/>
       </p:ext>
     </p:extLst>
   </p:cSld>

</xml_diff>

<commit_message>
Small text changes to the slides
</commit_message>
<xml_diff>
--- a/2020-04-14 ONETUG App Communication Juxtaposition/Presentation.pptx
+++ b/2020-04-14 ONETUG App Communication Juxtaposition/Presentation.pptx
@@ -3575,7 +3575,7 @@
 <dgm:dataModel xmlns:dgm="http://schemas.openxmlformats.org/drawingml/2006/diagram" xmlns:a="http://schemas.openxmlformats.org/drawingml/2006/main">
   <dgm:ptLst>
     <dgm:pt modelId="{E469074E-9D2E-45E6-89E9-70CFA76D7347}" type="doc">
-      <dgm:prSet loTypeId="urn:microsoft.com/office/officeart/2005/8/layout/hList1" loCatId="list" qsTypeId="urn:microsoft.com/office/officeart/2005/8/quickstyle/simple1" qsCatId="simple" csTypeId="urn:microsoft.com/office/officeart/2005/8/colors/colorful5" csCatId="colorful"/>
+      <dgm:prSet loTypeId="urn:microsoft.com/office/officeart/2005/8/layout/hList1" loCatId="list" qsTypeId="urn:microsoft.com/office/officeart/2005/8/quickstyle/simple1" qsCatId="simple" csTypeId="urn:microsoft.com/office/officeart/2005/8/colors/colorful5" csCatId="colorful" phldr="1"/>
       <dgm:spPr/>
       <dgm:t>
         <a:bodyPr/>
@@ -3593,8 +3593,8 @@
         <a:lstStyle/>
         <a:p>
           <a:r>
-            <a:rPr lang="en-US"/>
-            <a:t>JSON with REST</a:t>
+            <a:rPr lang="en-US" dirty="0"/>
+            <a:t>REST with JSON</a:t>
           </a:r>
         </a:p>
       </dgm:t>
@@ -4834,8 +4834,8 @@
             <a:buNone/>
           </a:pPr>
           <a:r>
-            <a:rPr lang="en-US" sz="2700" kern="1200"/>
-            <a:t>JSON with REST</a:t>
+            <a:rPr lang="en-US" sz="2700" kern="1200" dirty="0"/>
+            <a:t>REST with JSON</a:t>
           </a:r>
         </a:p>
       </dsp:txBody>
@@ -15400,7 +15400,7 @@
           <a:lstStyle/>
           <a:p>
             <a:r>
-              <a:rPr lang="en-US">
+              <a:rPr lang="en-US" dirty="0">
                 <a:solidFill>
                   <a:schemeClr val="accent1">
                     <a:lumMod val="60000"/>
@@ -15413,7 +15413,7 @@
           </a:p>
           <a:p>
             <a:r>
-              <a:rPr lang="en-US">
+              <a:rPr lang="en-US" dirty="0">
                 <a:solidFill>
                   <a:schemeClr val="accent1">
                     <a:lumMod val="60000"/>
@@ -15421,7 +15421,29 @@
                   </a:schemeClr>
                 </a:solidFill>
               </a:rPr>
-              <a:t>JSON vs GRPC vs SignalR Core</a:t>
+              <a:t>REST vs GRPC vs </a:t>
+            </a:r>
+            <a:r>
+              <a:rPr lang="en-US" dirty="0" err="1">
+                <a:solidFill>
+                  <a:schemeClr val="accent1">
+                    <a:lumMod val="60000"/>
+                    <a:lumOff val="40000"/>
+                  </a:schemeClr>
+                </a:solidFill>
+              </a:rPr>
+              <a:t>SignalR</a:t>
+            </a:r>
+            <a:r>
+              <a:rPr lang="en-US" dirty="0">
+                <a:solidFill>
+                  <a:schemeClr val="accent1">
+                    <a:lumMod val="60000"/>
+                    <a:lumOff val="40000"/>
+                  </a:schemeClr>
+                </a:solidFill>
+              </a:rPr>
+              <a:t> Core</a:t>
             </a:r>
           </a:p>
         </p:txBody>
@@ -18871,24 +18893,32 @@
           <a:lstStyle/>
           <a:p>
             <a:r>
-              <a:rPr lang="en-US" sz="2400"/>
-              <a:t>JSON vs GRPC vs SignalR Core</a:t>
+              <a:rPr lang="en-US" sz="2400" dirty="0"/>
+              <a:t>REST vs GRPC vs </a:t>
+            </a:r>
+            <a:r>
+              <a:rPr lang="en-US" sz="2400" dirty="0" err="1"/>
+              <a:t>SignalR</a:t>
+            </a:r>
+            <a:r>
+              <a:rPr lang="en-US" sz="2400" dirty="0"/>
+              <a:t> Core</a:t>
             </a:r>
           </a:p>
           <a:p>
             <a:r>
-              <a:rPr lang="en-US" sz="2400"/>
+              <a:rPr lang="en-US" sz="2400" dirty="0"/>
               <a:t>Comparing Pros/Cons of different technologies</a:t>
             </a:r>
           </a:p>
           <a:p>
             <a:r>
-              <a:rPr lang="en-US" sz="2400"/>
+              <a:rPr lang="en-US" sz="2400" dirty="0"/>
               <a:t>Deciding when to use one over the other</a:t>
             </a:r>
           </a:p>
           <a:p>
-            <a:endParaRPr lang="en-US" sz="2400"/>
+            <a:endParaRPr lang="en-US" sz="2400" dirty="0"/>
           </a:p>
         </p:txBody>
       </p:sp>
@@ -19552,7 +19582,7 @@
             <p:ph idx="1"/>
             <p:extLst>
               <p:ext uri="{D42A27DB-BD31-4B8C-83A1-F6EECF244321}">
-                <p14:modId xmlns:p14="http://schemas.microsoft.com/office/powerpoint/2010/main" val="1214987886"/>
+                <p14:modId xmlns:p14="http://schemas.microsoft.com/office/powerpoint/2010/main" val="3781067394"/>
               </p:ext>
             </p:extLst>
           </p:nvPr>

</xml_diff>